<commit_message>
Add check to see if file exists and create if not Remove some info that might confuse Add into on float limiting when formatting string
</commit_message>
<xml_diff>
--- a/OOP_in_Python.pptx
+++ b/OOP_in_Python.pptx
@@ -5,16 +5,16 @@
     <p:sldMasterId id="2147483660" r:id="rId1"/>
   </p:sldMasterIdLst>
   <p:sldIdLst>
-    <p:sldId id="256" r:id="rId2"/>
-    <p:sldId id="257" r:id="rId3"/>
-    <p:sldId id="258" r:id="rId4"/>
-    <p:sldId id="259" r:id="rId5"/>
-    <p:sldId id="260" r:id="rId6"/>
-    <p:sldId id="261" r:id="rId7"/>
-    <p:sldId id="262" r:id="rId8"/>
-    <p:sldId id="263" r:id="rId9"/>
-    <p:sldId id="264" r:id="rId10"/>
-    <p:sldId id="265" r:id="rId11"/>
+    <p:sldId id="256" r:id="rId6"/>
+    <p:sldId id="257" r:id="rId7"/>
+    <p:sldId id="258" r:id="rId8"/>
+    <p:sldId id="259" r:id="rId9"/>
+    <p:sldId id="260" r:id="rId10"/>
+    <p:sldId id="261" r:id="rId11"/>
+    <p:sldId id="262" r:id="rId12"/>
+    <p:sldId id="263" r:id="rId13"/>
+    <p:sldId id="264" r:id="rId14"/>
+    <p:sldId id="265" r:id="rId15"/>
   </p:sldIdLst>
   <p:sldSz cx="9144000" cy="6858000" type="screen4x3"/>
   <p:notesSz cx="6858000" cy="9144000"/>
@@ -368,7 +368,7 @@
     </p:spTree>
     <p:extLst>
       <p:ext uri="{BB962C8B-B14F-4D97-AF65-F5344CB8AC3E}">
-        <p14:creationId xmlns:p14="http://schemas.microsoft.com/office/powerpoint/2010/main" val="3628057100"/>
+        <p14:creationId xmlns:p14="http://schemas.microsoft.com/office/powerpoint/2010/main" val="3526625290"/>
       </p:ext>
     </p:extLst>
   </p:cSld>
@@ -666,7 +666,7 @@
     </p:spTree>
     <p:extLst>
       <p:ext uri="{BB962C8B-B14F-4D97-AF65-F5344CB8AC3E}">
-        <p14:creationId xmlns:p14="http://schemas.microsoft.com/office/powerpoint/2010/main" val="3938592191"/>
+        <p14:creationId xmlns:p14="http://schemas.microsoft.com/office/powerpoint/2010/main" val="1795962534"/>
       </p:ext>
     </p:extLst>
   </p:cSld>
@@ -858,7 +858,7 @@
     </p:spTree>
     <p:extLst>
       <p:ext uri="{BB962C8B-B14F-4D97-AF65-F5344CB8AC3E}">
-        <p14:creationId xmlns:p14="http://schemas.microsoft.com/office/powerpoint/2010/main" val="2276294163"/>
+        <p14:creationId xmlns:p14="http://schemas.microsoft.com/office/powerpoint/2010/main" val="1490798351"/>
       </p:ext>
     </p:extLst>
   </p:cSld>
@@ -1351,7 +1351,7 @@
     </p:spTree>
     <p:extLst>
       <p:ext uri="{BB962C8B-B14F-4D97-AF65-F5344CB8AC3E}">
-        <p14:creationId xmlns:p14="http://schemas.microsoft.com/office/powerpoint/2010/main" val="1092227588"/>
+        <p14:creationId xmlns:p14="http://schemas.microsoft.com/office/powerpoint/2010/main" val="2370310156"/>
       </p:ext>
     </p:extLst>
   </p:cSld>
@@ -1543,7 +1543,7 @@
     </p:spTree>
     <p:extLst>
       <p:ext uri="{BB962C8B-B14F-4D97-AF65-F5344CB8AC3E}">
-        <p14:creationId xmlns:p14="http://schemas.microsoft.com/office/powerpoint/2010/main" val="805317092"/>
+        <p14:creationId xmlns:p14="http://schemas.microsoft.com/office/powerpoint/2010/main" val="2997194949"/>
       </p:ext>
     </p:extLst>
   </p:cSld>
@@ -2080,7 +2080,7 @@
     </p:spTree>
     <p:extLst>
       <p:ext uri="{BB962C8B-B14F-4D97-AF65-F5344CB8AC3E}">
-        <p14:creationId xmlns:p14="http://schemas.microsoft.com/office/powerpoint/2010/main" val="1912085416"/>
+        <p14:creationId xmlns:p14="http://schemas.microsoft.com/office/powerpoint/2010/main" val="2341365015"/>
       </p:ext>
     </p:extLst>
   </p:cSld>
@@ -2944,7 +2944,7 @@
     </p:spTree>
     <p:extLst>
       <p:ext uri="{BB962C8B-B14F-4D97-AF65-F5344CB8AC3E}">
-        <p14:creationId xmlns:p14="http://schemas.microsoft.com/office/powerpoint/2010/main" val="713592452"/>
+        <p14:creationId xmlns:p14="http://schemas.microsoft.com/office/powerpoint/2010/main" val="2336751438"/>
       </p:ext>
     </p:extLst>
   </p:cSld>
@@ -3114,7 +3114,7 @@
     </p:spTree>
     <p:extLst>
       <p:ext uri="{BB962C8B-B14F-4D97-AF65-F5344CB8AC3E}">
-        <p14:creationId xmlns:p14="http://schemas.microsoft.com/office/powerpoint/2010/main" val="2256437184"/>
+        <p14:creationId xmlns:p14="http://schemas.microsoft.com/office/powerpoint/2010/main" val="1850202786"/>
       </p:ext>
     </p:extLst>
   </p:cSld>
@@ -3298,7 +3298,7 @@
     </p:spTree>
     <p:extLst>
       <p:ext uri="{BB962C8B-B14F-4D97-AF65-F5344CB8AC3E}">
-        <p14:creationId xmlns:p14="http://schemas.microsoft.com/office/powerpoint/2010/main" val="2553404779"/>
+        <p14:creationId xmlns:p14="http://schemas.microsoft.com/office/powerpoint/2010/main" val="2110296616"/>
       </p:ext>
     </p:extLst>
   </p:cSld>
@@ -3468,7 +3468,7 @@
     </p:spTree>
     <p:extLst>
       <p:ext uri="{BB962C8B-B14F-4D97-AF65-F5344CB8AC3E}">
-        <p14:creationId xmlns:p14="http://schemas.microsoft.com/office/powerpoint/2010/main" val="97633050"/>
+        <p14:creationId xmlns:p14="http://schemas.microsoft.com/office/powerpoint/2010/main" val="1615258263"/>
       </p:ext>
     </p:extLst>
   </p:cSld>
@@ -3712,7 +3712,7 @@
     </p:spTree>
     <p:extLst>
       <p:ext uri="{BB962C8B-B14F-4D97-AF65-F5344CB8AC3E}">
-        <p14:creationId xmlns:p14="http://schemas.microsoft.com/office/powerpoint/2010/main" val="3654816576"/>
+        <p14:creationId xmlns:p14="http://schemas.microsoft.com/office/powerpoint/2010/main" val="1273760500"/>
       </p:ext>
     </p:extLst>
   </p:cSld>
@@ -3948,7 +3948,7 @@
     </p:spTree>
     <p:extLst>
       <p:ext uri="{BB962C8B-B14F-4D97-AF65-F5344CB8AC3E}">
-        <p14:creationId xmlns:p14="http://schemas.microsoft.com/office/powerpoint/2010/main" val="2286053764"/>
+        <p14:creationId xmlns:p14="http://schemas.microsoft.com/office/powerpoint/2010/main" val="4044380996"/>
       </p:ext>
     </p:extLst>
   </p:cSld>
@@ -4414,7 +4414,7 @@
     </p:spTree>
     <p:extLst>
       <p:ext uri="{BB962C8B-B14F-4D97-AF65-F5344CB8AC3E}">
-        <p14:creationId xmlns:p14="http://schemas.microsoft.com/office/powerpoint/2010/main" val="1020561129"/>
+        <p14:creationId xmlns:p14="http://schemas.microsoft.com/office/powerpoint/2010/main" val="777584383"/>
       </p:ext>
     </p:extLst>
   </p:cSld>
@@ -4532,7 +4532,7 @@
     </p:spTree>
     <p:extLst>
       <p:ext uri="{BB962C8B-B14F-4D97-AF65-F5344CB8AC3E}">
-        <p14:creationId xmlns:p14="http://schemas.microsoft.com/office/powerpoint/2010/main" val="814322980"/>
+        <p14:creationId xmlns:p14="http://schemas.microsoft.com/office/powerpoint/2010/main" val="3973786660"/>
       </p:ext>
     </p:extLst>
   </p:cSld>
@@ -4627,7 +4627,7 @@
     </p:spTree>
     <p:extLst>
       <p:ext uri="{BB962C8B-B14F-4D97-AF65-F5344CB8AC3E}">
-        <p14:creationId xmlns:p14="http://schemas.microsoft.com/office/powerpoint/2010/main" val="2924407515"/>
+        <p14:creationId xmlns:p14="http://schemas.microsoft.com/office/powerpoint/2010/main" val="1503974685"/>
       </p:ext>
     </p:extLst>
   </p:cSld>
@@ -4882,7 +4882,7 @@
     </p:spTree>
     <p:extLst>
       <p:ext uri="{BB962C8B-B14F-4D97-AF65-F5344CB8AC3E}">
-        <p14:creationId xmlns:p14="http://schemas.microsoft.com/office/powerpoint/2010/main" val="3200724403"/>
+        <p14:creationId xmlns:p14="http://schemas.microsoft.com/office/powerpoint/2010/main" val="3728422137"/>
       </p:ext>
     </p:extLst>
   </p:cSld>
@@ -5182,7 +5182,7 @@
     </p:spTree>
     <p:extLst>
       <p:ext uri="{BB962C8B-B14F-4D97-AF65-F5344CB8AC3E}">
-        <p14:creationId xmlns:p14="http://schemas.microsoft.com/office/powerpoint/2010/main" val="3345722024"/>
+        <p14:creationId xmlns:p14="http://schemas.microsoft.com/office/powerpoint/2010/main" val="2028799097"/>
       </p:ext>
     </p:extLst>
   </p:cSld>
@@ -5466,7 +5466,7 @@
     </p:spTree>
     <p:extLst>
       <p:ext uri="{BB962C8B-B14F-4D97-AF65-F5344CB8AC3E}">
-        <p14:creationId xmlns:p14="http://schemas.microsoft.com/office/powerpoint/2010/main" val="4255221085"/>
+        <p14:creationId xmlns:p14="http://schemas.microsoft.com/office/powerpoint/2010/main" val="3610921552"/>
       </p:ext>
     </p:extLst>
   </p:cSld>
@@ -6023,7 +6023,7 @@
 </file>
 
 <file path=ppt/slides/slide1.xml><?xml version="1.0" encoding="utf-8"?>
-<p:sld xmlns:a="http://schemas.openxmlformats.org/drawingml/2006/main" xmlns:r="http://schemas.openxmlformats.org/officeDocument/2006/relationships" xmlns:p="http://schemas.openxmlformats.org/presentationml/2006/main">
+<p:sld xmlns:a="http://schemas.openxmlformats.org/drawingml/2006/main" xmlns:p="http://schemas.openxmlformats.org/presentationml/2006/main" xmlns:r="http://schemas.openxmlformats.org/officeDocument/2006/relationships">
   <p:cSld>
     <p:spTree>
       <p:nvGrpSpPr>
@@ -6031,14 +6031,7 @@
         <p:cNvGrpSpPr/>
         <p:nvPr/>
       </p:nvGrpSpPr>
-      <p:grpSpPr>
-        <a:xfrm>
-          <a:off x="0" y="0"/>
-          <a:ext cx="0" cy="0"/>
-          <a:chOff x="0" y="0"/>
-          <a:chExt cx="0" cy="0"/>
-        </a:xfrm>
-      </p:grpSpPr>
+      <p:grpSpPr/>
       <p:sp>
         <p:nvSpPr>
           <p:cNvPr id="2" name="Title 1"/>
@@ -6051,9 +6044,7 @@
         </p:nvSpPr>
         <p:spPr/>
         <p:txBody>
-          <a:bodyPr>
-            <a:normAutofit fontScale="90000"/>
-          </a:bodyPr>
+          <a:bodyPr/>
           <a:lstStyle/>
           <a:p>
             <a:r>
@@ -6092,7 +6083,7 @@
 </file>
 
 <file path=ppt/slides/slide10.xml><?xml version="1.0" encoding="utf-8"?>
-<p:sld xmlns:a="http://schemas.openxmlformats.org/drawingml/2006/main" xmlns:r="http://schemas.openxmlformats.org/officeDocument/2006/relationships" xmlns:p="http://schemas.openxmlformats.org/presentationml/2006/main">
+<p:sld xmlns:a="http://schemas.openxmlformats.org/drawingml/2006/main" xmlns:p="http://schemas.openxmlformats.org/presentationml/2006/main" xmlns:r="http://schemas.openxmlformats.org/officeDocument/2006/relationships">
   <p:cSld>
     <p:spTree>
       <p:nvGrpSpPr>
@@ -6100,14 +6091,7 @@
         <p:cNvGrpSpPr/>
         <p:nvPr/>
       </p:nvGrpSpPr>
-      <p:grpSpPr>
-        <a:xfrm>
-          <a:off x="0" y="0"/>
-          <a:ext cx="0" cy="0"/>
-          <a:chOff x="0" y="0"/>
-          <a:chExt cx="0" cy="0"/>
-        </a:xfrm>
-      </p:grpSpPr>
+      <p:grpSpPr/>
       <p:sp>
         <p:nvSpPr>
           <p:cNvPr id="2" name="Title 1"/>
@@ -6143,9 +6127,7 @@
         <p:txBody>
           <a:bodyPr/>
           <a:lstStyle/>
-          <a:p>
-            <a:endParaRPr/>
-          </a:p>
+          <a:p/>
           <a:p>
             <a:r>
               <a:t>- Python is an object-oriented programming language.</a:t>
@@ -6161,9 +6143,7 @@
               <a:t>- Python's simplicity and readability make it a great choice for learning and implementing OOP.</a:t>
             </a:r>
           </a:p>
-          <a:p>
-            <a:endParaRPr/>
-          </a:p>
+          <a:p/>
         </p:txBody>
       </p:sp>
     </p:spTree>
@@ -6175,7 +6155,7 @@
 </file>
 
 <file path=ppt/slides/slide2.xml><?xml version="1.0" encoding="utf-8"?>
-<p:sld xmlns:a="http://schemas.openxmlformats.org/drawingml/2006/main" xmlns:r="http://schemas.openxmlformats.org/officeDocument/2006/relationships" xmlns:p="http://schemas.openxmlformats.org/presentationml/2006/main">
+<p:sld xmlns:a="http://schemas.openxmlformats.org/drawingml/2006/main" xmlns:p="http://schemas.openxmlformats.org/presentationml/2006/main" xmlns:r="http://schemas.openxmlformats.org/officeDocument/2006/relationships">
   <p:cSld>
     <p:spTree>
       <p:nvGrpSpPr>
@@ -6183,14 +6163,7 @@
         <p:cNvGrpSpPr/>
         <p:nvPr/>
       </p:nvGrpSpPr>
-      <p:grpSpPr>
-        <a:xfrm>
-          <a:off x="0" y="0"/>
-          <a:ext cx="0" cy="0"/>
-          <a:chOff x="0" y="0"/>
-          <a:chExt cx="0" cy="0"/>
-        </a:xfrm>
-      </p:grpSpPr>
+      <p:grpSpPr/>
       <p:sp>
         <p:nvSpPr>
           <p:cNvPr id="2" name="Title 1"/>
@@ -6203,9 +6176,7 @@
         </p:nvSpPr>
         <p:spPr/>
         <p:txBody>
-          <a:bodyPr>
-            <a:normAutofit fontScale="90000"/>
-          </a:bodyPr>
+          <a:bodyPr/>
           <a:lstStyle/>
           <a:p>
             <a:r>
@@ -6228,9 +6199,7 @@
         <p:txBody>
           <a:bodyPr/>
           <a:lstStyle/>
-          <a:p>
-            <a:endParaRPr/>
-          </a:p>
+          <a:p/>
           <a:p>
             <a:r>
               <a:t>- Object-Oriented Programming (OOP) is a programming paradigm based on the concept of objects.</a:t>
@@ -6246,9 +6215,7 @@
               <a:t>- OOP aims to implement real-world entities like inheritance, polymorphism, encapsulation, and abstraction.</a:t>
             </a:r>
           </a:p>
-          <a:p>
-            <a:endParaRPr/>
-          </a:p>
+          <a:p/>
         </p:txBody>
       </p:sp>
     </p:spTree>
@@ -6260,7 +6227,7 @@
 </file>
 
 <file path=ppt/slides/slide3.xml><?xml version="1.0" encoding="utf-8"?>
-<p:sld xmlns:a="http://schemas.openxmlformats.org/drawingml/2006/main" xmlns:r="http://schemas.openxmlformats.org/officeDocument/2006/relationships" xmlns:p="http://schemas.openxmlformats.org/presentationml/2006/main">
+<p:sld xmlns:a="http://schemas.openxmlformats.org/drawingml/2006/main" xmlns:p="http://schemas.openxmlformats.org/presentationml/2006/main" xmlns:r="http://schemas.openxmlformats.org/officeDocument/2006/relationships">
   <p:cSld>
     <p:spTree>
       <p:nvGrpSpPr>
@@ -6268,14 +6235,7 @@
         <p:cNvGrpSpPr/>
         <p:nvPr/>
       </p:nvGrpSpPr>
-      <p:grpSpPr>
-        <a:xfrm>
-          <a:off x="0" y="0"/>
-          <a:ext cx="0" cy="0"/>
-          <a:chOff x="0" y="0"/>
-          <a:chExt cx="0" cy="0"/>
-        </a:xfrm>
-      </p:grpSpPr>
+      <p:grpSpPr/>
       <p:sp>
         <p:nvSpPr>
           <p:cNvPr id="2" name="Title 1"/>
@@ -6311,84 +6271,48 @@
         <p:txBody>
           <a:bodyPr/>
           <a:lstStyle/>
-          <a:p>
-            <a:endParaRPr dirty="0"/>
-          </a:p>
-          <a:p>
-            <a:r>
-              <a:rPr dirty="0"/>
+          <a:p/>
+          <a:p>
+            <a:r>
               <a:t>- A class is a blueprint for creating objects.</a:t>
             </a:r>
           </a:p>
           <a:p>
             <a:r>
-              <a:rPr dirty="0"/>
               <a:t>- An object is an instance of a class.</a:t>
             </a:r>
           </a:p>
           <a:p>
             <a:r>
-              <a:rPr dirty="0"/>
               <a:t>- Example:</a:t>
             </a:r>
           </a:p>
           <a:p>
             <a:r>
-              <a:rPr dirty="0"/>
               <a:t>  class Dog:</a:t>
             </a:r>
           </a:p>
           <a:p>
             <a:r>
-              <a:rPr dirty="0"/>
-              <a:t>      def __</a:t>
-            </a:r>
-            <a:r>
-              <a:rPr dirty="0" err="1"/>
-              <a:t>init</a:t>
-            </a:r>
-            <a:r>
-              <a:rPr dirty="0"/>
-              <a:t>__(self, name, age):</a:t>
-            </a:r>
-          </a:p>
-          <a:p>
-            <a:r>
-              <a:rPr dirty="0"/>
+              <a:t>      def __init__(self, name, age):</a:t>
+            </a:r>
+          </a:p>
+          <a:p>
+            <a:r>
               <a:t>          self.name = name</a:t>
             </a:r>
           </a:p>
           <a:p>
             <a:r>
-              <a:rPr dirty="0"/>
-              <a:t>          </a:t>
-            </a:r>
-            <a:r>
-              <a:rPr dirty="0" err="1"/>
-              <a:t>self.age</a:t>
-            </a:r>
-            <a:r>
-              <a:rPr dirty="0"/>
-              <a:t> = age</a:t>
-            </a:r>
-          </a:p>
-          <a:p>
-            <a:r>
-              <a:rPr dirty="0"/>
-              <a:t>  </a:t>
-            </a:r>
-            <a:r>
-              <a:rPr dirty="0" err="1"/>
-              <a:t>my_dog</a:t>
-            </a:r>
-            <a:r>
-              <a:rPr dirty="0"/>
-              <a:t> = Dog("Buddy", 3)</a:t>
-            </a:r>
-          </a:p>
-          <a:p>
-            <a:endParaRPr dirty="0"/>
-          </a:p>
+              <a:t>          self.age = age</a:t>
+            </a:r>
+          </a:p>
+          <a:p>
+            <a:r>
+              <a:t>  my_dog = Dog("Buddy", 3)</a:t>
+            </a:r>
+          </a:p>
+          <a:p/>
         </p:txBody>
       </p:sp>
     </p:spTree>
@@ -6400,7 +6324,7 @@
 </file>
 
 <file path=ppt/slides/slide4.xml><?xml version="1.0" encoding="utf-8"?>
-<p:sld xmlns:a="http://schemas.openxmlformats.org/drawingml/2006/main" xmlns:r="http://schemas.openxmlformats.org/officeDocument/2006/relationships" xmlns:p="http://schemas.openxmlformats.org/presentationml/2006/main">
+<p:sld xmlns:a="http://schemas.openxmlformats.org/drawingml/2006/main" xmlns:p="http://schemas.openxmlformats.org/presentationml/2006/main" xmlns:r="http://schemas.openxmlformats.org/officeDocument/2006/relationships">
   <p:cSld>
     <p:spTree>
       <p:nvGrpSpPr>
@@ -6408,14 +6332,7 @@
         <p:cNvGrpSpPr/>
         <p:nvPr/>
       </p:nvGrpSpPr>
-      <p:grpSpPr>
-        <a:xfrm>
-          <a:off x="0" y="0"/>
-          <a:ext cx="0" cy="0"/>
-          <a:chOff x="0" y="0"/>
-          <a:chExt cx="0" cy="0"/>
-        </a:xfrm>
-      </p:grpSpPr>
+      <p:grpSpPr/>
       <p:sp>
         <p:nvSpPr>
           <p:cNvPr id="2" name="Title 1"/>
@@ -6449,13 +6366,9 @@
         </p:nvSpPr>
         <p:spPr/>
         <p:txBody>
-          <a:bodyPr>
-            <a:normAutofit fontScale="92500" lnSpcReduction="10000"/>
-          </a:bodyPr>
-          <a:lstStyle/>
-          <a:p>
-            <a:endParaRPr/>
-          </a:p>
+          <a:bodyPr/>
+          <a:lstStyle/>
+          <a:p/>
           <a:p>
             <a:r>
               <a:t>- Attributes are variables that belong to an object.</a:t>
@@ -6501,9 +6414,7 @@
               <a:t>          print("Woof!")</a:t>
             </a:r>
           </a:p>
-          <a:p>
-            <a:endParaRPr/>
-          </a:p>
+          <a:p/>
         </p:txBody>
       </p:sp>
     </p:spTree>
@@ -6515,7 +6426,7 @@
 </file>
 
 <file path=ppt/slides/slide5.xml><?xml version="1.0" encoding="utf-8"?>
-<p:sld xmlns:a="http://schemas.openxmlformats.org/drawingml/2006/main" xmlns:r="http://schemas.openxmlformats.org/officeDocument/2006/relationships" xmlns:p="http://schemas.openxmlformats.org/presentationml/2006/main">
+<p:sld xmlns:a="http://schemas.openxmlformats.org/drawingml/2006/main" xmlns:p="http://schemas.openxmlformats.org/presentationml/2006/main" xmlns:r="http://schemas.openxmlformats.org/officeDocument/2006/relationships">
   <p:cSld>
     <p:spTree>
       <p:nvGrpSpPr>
@@ -6523,14 +6434,7 @@
         <p:cNvGrpSpPr/>
         <p:nvPr/>
       </p:nvGrpSpPr>
-      <p:grpSpPr>
-        <a:xfrm>
-          <a:off x="0" y="0"/>
-          <a:ext cx="0" cy="0"/>
-          <a:chOff x="0" y="0"/>
-          <a:chExt cx="0" cy="0"/>
-        </a:xfrm>
-      </p:grpSpPr>
+      <p:grpSpPr/>
       <p:sp>
         <p:nvSpPr>
           <p:cNvPr id="2" name="Title 1"/>
@@ -6564,13 +6468,9 @@
         </p:nvSpPr>
         <p:spPr/>
         <p:txBody>
-          <a:bodyPr>
-            <a:normAutofit fontScale="70000" lnSpcReduction="20000"/>
-          </a:bodyPr>
-          <a:lstStyle/>
-          <a:p>
-            <a:endParaRPr/>
-          </a:p>
+          <a:bodyPr/>
+          <a:lstStyle/>
+          <a:p/>
           <a:p>
             <a:r>
               <a:t>- Inheritance allows a class to inherit attributes and methods from another class.</a:t>
@@ -6626,9 +6526,7 @@
               <a:t>  my_dog.bark()</a:t>
             </a:r>
           </a:p>
-          <a:p>
-            <a:endParaRPr/>
-          </a:p>
+          <a:p/>
         </p:txBody>
       </p:sp>
     </p:spTree>
@@ -6640,7 +6538,7 @@
 </file>
 
 <file path=ppt/slides/slide6.xml><?xml version="1.0" encoding="utf-8"?>
-<p:sld xmlns:a="http://schemas.openxmlformats.org/drawingml/2006/main" xmlns:r="http://schemas.openxmlformats.org/officeDocument/2006/relationships" xmlns:p="http://schemas.openxmlformats.org/presentationml/2006/main">
+<p:sld xmlns:a="http://schemas.openxmlformats.org/drawingml/2006/main" xmlns:p="http://schemas.openxmlformats.org/presentationml/2006/main" xmlns:r="http://schemas.openxmlformats.org/officeDocument/2006/relationships">
   <p:cSld>
     <p:spTree>
       <p:nvGrpSpPr>
@@ -6648,14 +6546,7 @@
         <p:cNvGrpSpPr/>
         <p:nvPr/>
       </p:nvGrpSpPr>
-      <p:grpSpPr>
-        <a:xfrm>
-          <a:off x="0" y="0"/>
-          <a:ext cx="0" cy="0"/>
-          <a:chOff x="0" y="0"/>
-          <a:chExt cx="0" cy="0"/>
-        </a:xfrm>
-      </p:grpSpPr>
+      <p:grpSpPr/>
       <p:sp>
         <p:nvSpPr>
           <p:cNvPr id="2" name="Title 1"/>
@@ -6689,13 +6580,9 @@
         </p:nvSpPr>
         <p:spPr/>
         <p:txBody>
-          <a:bodyPr>
-            <a:normAutofit fontScale="70000" lnSpcReduction="20000"/>
-          </a:bodyPr>
-          <a:lstStyle/>
-          <a:p>
-            <a:endParaRPr/>
-          </a:p>
+          <a:bodyPr/>
+          <a:lstStyle/>
+          <a:p/>
           <a:p>
             <a:r>
               <a:t>- Polymorphism allows methods to do different things based on the object it is acting upon.</a:t>
@@ -6751,9 +6638,7 @@
               <a:t>      print(animal.speak())</a:t>
             </a:r>
           </a:p>
-          <a:p>
-            <a:endParaRPr/>
-          </a:p>
+          <a:p/>
         </p:txBody>
       </p:sp>
     </p:spTree>
@@ -6765,7 +6650,7 @@
 </file>
 
 <file path=ppt/slides/slide7.xml><?xml version="1.0" encoding="utf-8"?>
-<p:sld xmlns:a="http://schemas.openxmlformats.org/drawingml/2006/main" xmlns:r="http://schemas.openxmlformats.org/officeDocument/2006/relationships" xmlns:p="http://schemas.openxmlformats.org/presentationml/2006/main">
+<p:sld xmlns:a="http://schemas.openxmlformats.org/drawingml/2006/main" xmlns:p="http://schemas.openxmlformats.org/presentationml/2006/main" xmlns:r="http://schemas.openxmlformats.org/officeDocument/2006/relationships">
   <p:cSld>
     <p:spTree>
       <p:nvGrpSpPr>
@@ -6773,14 +6658,7 @@
         <p:cNvGrpSpPr/>
         <p:nvPr/>
       </p:nvGrpSpPr>
-      <p:grpSpPr>
-        <a:xfrm>
-          <a:off x="0" y="0"/>
-          <a:ext cx="0" cy="0"/>
-          <a:chOff x="0" y="0"/>
-          <a:chExt cx="0" cy="0"/>
-        </a:xfrm>
-      </p:grpSpPr>
+      <p:grpSpPr/>
       <p:sp>
         <p:nvSpPr>
           <p:cNvPr id="2" name="Title 1"/>
@@ -6814,13 +6692,9 @@
         </p:nvSpPr>
         <p:spPr/>
         <p:txBody>
-          <a:bodyPr>
-            <a:normAutofit fontScale="70000" lnSpcReduction="20000"/>
-          </a:bodyPr>
-          <a:lstStyle/>
-          <a:p>
-            <a:endParaRPr/>
-          </a:p>
+          <a:bodyPr/>
+          <a:lstStyle/>
+          <a:p/>
           <a:p>
             <a:r>
               <a:t>- Encapsulation is the concept of wrapping data and methods into a single unit (class).</a:t>
@@ -6876,9 +6750,7 @@
               <a:t>  print(person.get_name())</a:t>
             </a:r>
           </a:p>
-          <a:p>
-            <a:endParaRPr/>
-          </a:p>
+          <a:p/>
         </p:txBody>
       </p:sp>
     </p:spTree>
@@ -6890,7 +6762,7 @@
 </file>
 
 <file path=ppt/slides/slide8.xml><?xml version="1.0" encoding="utf-8"?>
-<p:sld xmlns:a="http://schemas.openxmlformats.org/drawingml/2006/main" xmlns:r="http://schemas.openxmlformats.org/officeDocument/2006/relationships" xmlns:p="http://schemas.openxmlformats.org/presentationml/2006/main">
+<p:sld xmlns:a="http://schemas.openxmlformats.org/drawingml/2006/main" xmlns:p="http://schemas.openxmlformats.org/presentationml/2006/main" xmlns:r="http://schemas.openxmlformats.org/officeDocument/2006/relationships">
   <p:cSld>
     <p:spTree>
       <p:nvGrpSpPr>
@@ -6898,14 +6770,7 @@
         <p:cNvGrpSpPr/>
         <p:nvPr/>
       </p:nvGrpSpPr>
-      <p:grpSpPr>
-        <a:xfrm>
-          <a:off x="0" y="0"/>
-          <a:ext cx="0" cy="0"/>
-          <a:chOff x="0" y="0"/>
-          <a:chExt cx="0" cy="0"/>
-        </a:xfrm>
-      </p:grpSpPr>
+      <p:grpSpPr/>
       <p:sp>
         <p:nvSpPr>
           <p:cNvPr id="2" name="Title 1"/>
@@ -6939,13 +6804,9 @@
         </p:nvSpPr>
         <p:spPr/>
         <p:txBody>
-          <a:bodyPr>
-            <a:normAutofit fontScale="62500" lnSpcReduction="20000"/>
-          </a:bodyPr>
-          <a:lstStyle/>
-          <a:p>
-            <a:endParaRPr/>
-          </a:p>
+          <a:bodyPr/>
+          <a:lstStyle/>
+          <a:p/>
           <a:p>
             <a:r>
               <a:t>- Abstraction is the concept of hiding the complex implementation details and showing only the necessary features.</a:t>
@@ -7011,9 +6872,7 @@
               <a:t>  print(dog.make_sound())</a:t>
             </a:r>
           </a:p>
-          <a:p>
-            <a:endParaRPr/>
-          </a:p>
+          <a:p/>
         </p:txBody>
       </p:sp>
     </p:spTree>
@@ -7025,7 +6884,7 @@
 </file>
 
 <file path=ppt/slides/slide9.xml><?xml version="1.0" encoding="utf-8"?>
-<p:sld xmlns:a="http://schemas.openxmlformats.org/drawingml/2006/main" xmlns:r="http://schemas.openxmlformats.org/officeDocument/2006/relationships" xmlns:p="http://schemas.openxmlformats.org/presentationml/2006/main">
+<p:sld xmlns:a="http://schemas.openxmlformats.org/drawingml/2006/main" xmlns:p="http://schemas.openxmlformats.org/presentationml/2006/main" xmlns:r="http://schemas.openxmlformats.org/officeDocument/2006/relationships">
   <p:cSld>
     <p:spTree>
       <p:nvGrpSpPr>
@@ -7033,14 +6892,7 @@
         <p:cNvGrpSpPr/>
         <p:nvPr/>
       </p:nvGrpSpPr>
-      <p:grpSpPr>
-        <a:xfrm>
-          <a:off x="0" y="0"/>
-          <a:ext cx="0" cy="0"/>
-          <a:chOff x="0" y="0"/>
-          <a:chExt cx="0" cy="0"/>
-        </a:xfrm>
-      </p:grpSpPr>
+      <p:grpSpPr/>
       <p:sp>
         <p:nvSpPr>
           <p:cNvPr id="2" name="Title 1"/>
@@ -7076,9 +6928,7 @@
         <p:txBody>
           <a:bodyPr/>
           <a:lstStyle/>
-          <a:p>
-            <a:endParaRPr/>
-          </a:p>
+          <a:p/>
           <a:p>
             <a:r>
               <a:t>- Modularity: Code is organized into objects.</a:t>
@@ -7099,9 +6949,7 @@
               <a:t>- Maintainability: Code is easier to manage and maintain.</a:t>
             </a:r>
           </a:p>
-          <a:p>
-            <a:endParaRPr/>
-          </a:p>
+          <a:p/>
         </p:txBody>
       </p:sp>
     </p:spTree>

</xml_diff>